<commit_message>
Add : Architectures.png + Stab : Cours Python
</commit_message>
<xml_diff>
--- a/support/Cours Python.pptx
+++ b/support/Cours Python.pptx
@@ -267,7 +267,7 @@
           <a:p>
             <a:fld id="{650C0CF7-E1DE-4CE2-B767-3B77CFF73DBC}" type="datetimeFigureOut">
               <a:rPr lang="fr-FR" smtClean="0"/>
-              <a:t>26/10/2022</a:t>
+              <a:t>18/10/2023</a:t>
             </a:fld>
             <a:endParaRPr lang="fr-FR"/>
           </a:p>
@@ -1594,7 +1594,7 @@
                 <a:tabLst/>
                 <a:defRPr/>
               </a:pPr>
-              <a:t>10/26/2022</a:t>
+              <a:t>10/18/2023</a:t>
             </a:fld>
             <a:endParaRPr kumimoji="0" lang="en-US" sz="1000" b="0" i="0" u="none" strike="noStrike" kern="1200" cap="none" spc="0" normalizeH="0" baseline="0" noProof="0" dirty="0">
               <a:ln>
@@ -1993,7 +1993,7 @@
                 <a:tabLst/>
                 <a:defRPr/>
               </a:pPr>
-              <a:t>10/26/2022</a:t>
+              <a:t>10/18/2023</a:t>
             </a:fld>
             <a:endParaRPr kumimoji="0" lang="en-US" sz="1000" b="0" i="0" u="none" strike="noStrike" kern="1200" cap="none" spc="0" normalizeH="0" baseline="0" noProof="0" dirty="0">
               <a:ln>
@@ -2732,7 +2732,7 @@
                 <a:tabLst/>
                 <a:defRPr/>
               </a:pPr>
-              <a:t>10/26/2022</a:t>
+              <a:t>10/18/2023</a:t>
             </a:fld>
             <a:endParaRPr kumimoji="0" lang="en-US" sz="1000" b="0" i="0" u="none" strike="noStrike" kern="1200" cap="none" spc="0" normalizeH="0" baseline="0" noProof="0" dirty="0">
               <a:ln>
@@ -3131,7 +3131,7 @@
                 <a:tabLst/>
                 <a:defRPr/>
               </a:pPr>
-              <a:t>10/26/2022</a:t>
+              <a:t>10/18/2023</a:t>
             </a:fld>
             <a:endParaRPr kumimoji="0" lang="en-US" sz="1000" b="0" i="0" u="none" strike="noStrike" kern="1200" cap="none" spc="0" normalizeH="0" baseline="0" noProof="0" dirty="0">
               <a:ln>
@@ -3862,7 +3862,7 @@
                 <a:tabLst/>
                 <a:defRPr/>
               </a:pPr>
-              <a:t>10/26/2022</a:t>
+              <a:t>10/18/2023</a:t>
             </a:fld>
             <a:endParaRPr kumimoji="0" lang="en-US" sz="1000" b="0" i="0" u="none" strike="noStrike" kern="1200" cap="none" spc="0" normalizeH="0" baseline="0" noProof="0" dirty="0">
               <a:ln>
@@ -4310,7 +4310,7 @@
                 <a:tabLst/>
                 <a:defRPr/>
               </a:pPr>
-              <a:t>10/26/2022</a:t>
+              <a:t>10/18/2023</a:t>
             </a:fld>
             <a:endParaRPr kumimoji="0" lang="en-US" sz="1000" b="0" i="0" u="none" strike="noStrike" kern="1200" cap="none" spc="0" normalizeH="0" baseline="0" noProof="0" dirty="0">
               <a:ln>
@@ -4635,7 +4635,7 @@
                 <a:tabLst/>
                 <a:defRPr/>
               </a:pPr>
-              <a:t>10/26/2022</a:t>
+              <a:t>10/18/2023</a:t>
             </a:fld>
             <a:endParaRPr kumimoji="0" lang="en-US" sz="1000" b="0" i="0" u="none" strike="noStrike" kern="1200" cap="none" spc="0" normalizeH="0" baseline="0" noProof="0" dirty="0">
               <a:ln>
@@ -4965,7 +4965,7 @@
                 <a:tabLst/>
                 <a:defRPr/>
               </a:pPr>
-              <a:t>10/26/2022</a:t>
+              <a:t>10/18/2023</a:t>
             </a:fld>
             <a:endParaRPr kumimoji="0" lang="en-US" sz="1000" b="0" i="0" u="none" strike="noStrike" kern="1200" cap="none" spc="0" normalizeH="0" baseline="0" noProof="0" dirty="0">
               <a:ln>
@@ -5329,7 +5329,7 @@
                 <a:tabLst/>
                 <a:defRPr/>
               </a:pPr>
-              <a:t>10/26/2022</a:t>
+              <a:t>10/18/2023</a:t>
             </a:fld>
             <a:endParaRPr kumimoji="0" lang="en-US" sz="1000" b="0" i="0" u="none" strike="noStrike" kern="1200" cap="none" spc="0" normalizeH="0" baseline="0" noProof="0" dirty="0">
               <a:ln>
@@ -6273,7 +6273,7 @@
                 <a:tabLst/>
                 <a:defRPr/>
               </a:pPr>
-              <a:t>10/26/2022</a:t>
+              <a:t>10/18/2023</a:t>
             </a:fld>
             <a:endParaRPr kumimoji="0" lang="en-US" sz="1000" b="0" i="0" u="none" strike="noStrike" kern="1200" cap="none" spc="0" normalizeH="0" baseline="0" noProof="0" dirty="0">
               <a:ln>
@@ -6865,7 +6865,7 @@
                 <a:tabLst/>
                 <a:defRPr/>
               </a:pPr>
-              <a:t>10/26/2022</a:t>
+              <a:t>10/18/2023</a:t>
             </a:fld>
             <a:endParaRPr kumimoji="0" lang="en-US" sz="1000" b="0" i="0" u="none" strike="noStrike" kern="1200" cap="none" spc="0" normalizeH="0" baseline="0" noProof="0" dirty="0">
               <a:ln>
@@ -7133,7 +7133,7 @@
                 <a:tabLst/>
                 <a:defRPr/>
               </a:pPr>
-              <a:t>10/26/2022</a:t>
+              <a:t>10/18/2023</a:t>
             </a:fld>
             <a:endParaRPr kumimoji="0" lang="en-US" sz="1000" b="0" i="0" u="none" strike="noStrike" kern="1200" cap="none" spc="0" normalizeH="0" baseline="0" noProof="0" dirty="0">
               <a:ln>
@@ -7378,7 +7378,7 @@
                 <a:tabLst/>
                 <a:defRPr/>
               </a:pPr>
-              <a:t>10/26/2022</a:t>
+              <a:t>10/18/2023</a:t>
             </a:fld>
             <a:endParaRPr kumimoji="0" lang="en-US" sz="1000" b="0" i="0" u="none" strike="noStrike" kern="1200" cap="none" spc="0" normalizeH="0" baseline="0" noProof="0" dirty="0">
               <a:ln>
@@ -7811,7 +7811,7 @@
                 <a:tabLst/>
                 <a:defRPr/>
               </a:pPr>
-              <a:t>10/26/2022</a:t>
+              <a:t>10/18/2023</a:t>
             </a:fld>
             <a:endParaRPr kumimoji="0" lang="en-US" sz="1000" b="0" i="0" u="none" strike="noStrike" kern="1200" cap="none" spc="0" normalizeH="0" baseline="0" noProof="0" dirty="0">
               <a:ln>
@@ -8252,7 +8252,7 @@
                 <a:tabLst/>
                 <a:defRPr/>
               </a:pPr>
-              <a:t>10/26/2022</a:t>
+              <a:t>10/18/2023</a:t>
             </a:fld>
             <a:endParaRPr kumimoji="0" lang="en-US" sz="1000" b="0" i="0" u="none" strike="noStrike" kern="1200" cap="none" spc="0" normalizeH="0" baseline="0" noProof="0" dirty="0">
               <a:ln>
@@ -8932,7 +8932,7 @@
                 <a:tabLst/>
                 <a:defRPr/>
               </a:pPr>
-              <a:t>10/26/2022</a:t>
+              <a:t>10/18/2023</a:t>
             </a:fld>
             <a:endParaRPr kumimoji="0" lang="en-US" sz="1000" b="0" i="0" u="none" strike="noStrike" kern="1200" cap="none" spc="0" normalizeH="0" baseline="0" noProof="0" dirty="0">
               <a:ln>
@@ -9596,7 +9596,10 @@
           <a:bodyPr/>
           <a:lstStyle/>
           <a:p>
-            <a:endParaRPr lang="fr-FR" dirty="0"/>
+            <a:r>
+              <a:rPr lang="fr-FR" dirty="0"/>
+              <a:t> </a:t>
+            </a:r>
           </a:p>
         </p:txBody>
       </p:sp>
@@ -9921,7 +9924,7 @@
                   </a:schemeClr>
                 </a:solidFill>
               </a:rPr>
-              <a:t>s[0]=‘S’ </a:t>
+              <a:t>c[0]=‘S’ </a:t>
             </a:r>
           </a:p>
           <a:p>
@@ -14925,7 +14928,7 @@
                   </a:schemeClr>
                 </a:solidFill>
               </a:rPr>
-              <a:t>	variable1 = "Hello"</a:t>
+              <a:t>	variable1 = "Hello"  </a:t>
             </a:r>
           </a:p>
           <a:p>
@@ -14965,11 +14968,6 @@
               </a:rPr>
               <a:t> "Bye"</a:t>
             </a:r>
-          </a:p>
-          <a:p>
-            <a:pPr marL="914400" lvl="2" indent="0">
-              <a:buNone/>
-            </a:pPr>
             <a:endParaRPr lang="fr-FR" dirty="0"/>
           </a:p>
           <a:p>

</xml_diff>